<commit_message>
Added data viz and reorganized
</commit_message>
<xml_diff>
--- a/Files/Images/Content.pptx
+++ b/Files/Images/Content.pptx
@@ -6,6 +6,7 @@
   </p:sldMasterIdLst>
   <p:sldIdLst>
     <p:sldId id="256" r:id="rId2"/>
+    <p:sldId id="257" r:id="rId3"/>
   </p:sldIdLst>
   <p:sldSz cx="12192000" cy="6858000"/>
   <p:notesSz cx="6858000" cy="9144000"/>
@@ -259,7 +260,7 @@
           <a:p>
             <a:fld id="{DDDFD9E1-728A-3C4F-BA7D-0994F9A96443}" type="datetimeFigureOut">
               <a:rPr lang="en-US" smtClean="0"/>
-              <a:t>9/25/23</a:t>
+              <a:t>9/29/23</a:t>
             </a:fld>
             <a:endParaRPr lang="en-US"/>
           </a:p>
@@ -457,7 +458,7 @@
           <a:p>
             <a:fld id="{DDDFD9E1-728A-3C4F-BA7D-0994F9A96443}" type="datetimeFigureOut">
               <a:rPr lang="en-US" smtClean="0"/>
-              <a:t>9/25/23</a:t>
+              <a:t>9/29/23</a:t>
             </a:fld>
             <a:endParaRPr lang="en-US"/>
           </a:p>
@@ -665,7 +666,7 @@
           <a:p>
             <a:fld id="{DDDFD9E1-728A-3C4F-BA7D-0994F9A96443}" type="datetimeFigureOut">
               <a:rPr lang="en-US" smtClean="0"/>
-              <a:t>9/25/23</a:t>
+              <a:t>9/29/23</a:t>
             </a:fld>
             <a:endParaRPr lang="en-US"/>
           </a:p>
@@ -863,7 +864,7 @@
           <a:p>
             <a:fld id="{DDDFD9E1-728A-3C4F-BA7D-0994F9A96443}" type="datetimeFigureOut">
               <a:rPr lang="en-US" smtClean="0"/>
-              <a:t>9/25/23</a:t>
+              <a:t>9/29/23</a:t>
             </a:fld>
             <a:endParaRPr lang="en-US"/>
           </a:p>
@@ -1138,7 +1139,7 @@
           <a:p>
             <a:fld id="{DDDFD9E1-728A-3C4F-BA7D-0994F9A96443}" type="datetimeFigureOut">
               <a:rPr lang="en-US" smtClean="0"/>
-              <a:t>9/25/23</a:t>
+              <a:t>9/29/23</a:t>
             </a:fld>
             <a:endParaRPr lang="en-US"/>
           </a:p>
@@ -1403,7 +1404,7 @@
           <a:p>
             <a:fld id="{DDDFD9E1-728A-3C4F-BA7D-0994F9A96443}" type="datetimeFigureOut">
               <a:rPr lang="en-US" smtClean="0"/>
-              <a:t>9/25/23</a:t>
+              <a:t>9/29/23</a:t>
             </a:fld>
             <a:endParaRPr lang="en-US"/>
           </a:p>
@@ -1815,7 +1816,7 @@
           <a:p>
             <a:fld id="{DDDFD9E1-728A-3C4F-BA7D-0994F9A96443}" type="datetimeFigureOut">
               <a:rPr lang="en-US" smtClean="0"/>
-              <a:t>9/25/23</a:t>
+              <a:t>9/29/23</a:t>
             </a:fld>
             <a:endParaRPr lang="en-US"/>
           </a:p>
@@ -1956,7 +1957,7 @@
           <a:p>
             <a:fld id="{DDDFD9E1-728A-3C4F-BA7D-0994F9A96443}" type="datetimeFigureOut">
               <a:rPr lang="en-US" smtClean="0"/>
-              <a:t>9/25/23</a:t>
+              <a:t>9/29/23</a:t>
             </a:fld>
             <a:endParaRPr lang="en-US"/>
           </a:p>
@@ -2069,7 +2070,7 @@
           <a:p>
             <a:fld id="{DDDFD9E1-728A-3C4F-BA7D-0994F9A96443}" type="datetimeFigureOut">
               <a:rPr lang="en-US" smtClean="0"/>
-              <a:t>9/25/23</a:t>
+              <a:t>9/29/23</a:t>
             </a:fld>
             <a:endParaRPr lang="en-US"/>
           </a:p>
@@ -2380,7 +2381,7 @@
           <a:p>
             <a:fld id="{DDDFD9E1-728A-3C4F-BA7D-0994F9A96443}" type="datetimeFigureOut">
               <a:rPr lang="en-US" smtClean="0"/>
-              <a:t>9/25/23</a:t>
+              <a:t>9/29/23</a:t>
             </a:fld>
             <a:endParaRPr lang="en-US"/>
           </a:p>
@@ -2668,7 +2669,7 @@
           <a:p>
             <a:fld id="{DDDFD9E1-728A-3C4F-BA7D-0994F9A96443}" type="datetimeFigureOut">
               <a:rPr lang="en-US" smtClean="0"/>
-              <a:t>9/25/23</a:t>
+              <a:t>9/29/23</a:t>
             </a:fld>
             <a:endParaRPr lang="en-US"/>
           </a:p>
@@ -2909,7 +2910,7 @@
           <a:p>
             <a:fld id="{DDDFD9E1-728A-3C4F-BA7D-0994F9A96443}" type="datetimeFigureOut">
               <a:rPr lang="en-US" smtClean="0"/>
-              <a:t>9/25/23</a:t>
+              <a:t>9/29/23</a:t>
             </a:fld>
             <a:endParaRPr lang="en-US"/>
           </a:p>
@@ -4808,6 +4809,764 @@
 </p:sld>
 </file>
 
+<file path=ppt/slides/slide2.xml><?xml version="1.0" encoding="utf-8"?>
+<p:sld xmlns:a="http://schemas.openxmlformats.org/drawingml/2006/main" xmlns:r="http://schemas.openxmlformats.org/officeDocument/2006/relationships" xmlns:p="http://schemas.openxmlformats.org/presentationml/2006/main">
+  <p:cSld>
+    <p:spTree>
+      <p:nvGrpSpPr>
+        <p:cNvPr id="1" name=""/>
+        <p:cNvGrpSpPr/>
+        <p:nvPr/>
+      </p:nvGrpSpPr>
+      <p:grpSpPr>
+        <a:xfrm>
+          <a:off x="0" y="0"/>
+          <a:ext cx="0" cy="0"/>
+          <a:chOff x="0" y="0"/>
+          <a:chExt cx="0" cy="0"/>
+        </a:xfrm>
+      </p:grpSpPr>
+      <p:grpSp>
+        <p:nvGrpSpPr>
+          <p:cNvPr id="12" name="Group 11">
+            <a:extLst>
+              <a:ext uri="{FF2B5EF4-FFF2-40B4-BE49-F238E27FC236}">
+                <a16:creationId xmlns:a16="http://schemas.microsoft.com/office/drawing/2014/main" id="{17867FD5-0333-48B9-5AB4-8C7352015952}"/>
+              </a:ext>
+            </a:extLst>
+          </p:cNvPr>
+          <p:cNvGrpSpPr/>
+          <p:nvPr/>
+        </p:nvGrpSpPr>
+        <p:grpSpPr>
+          <a:xfrm>
+            <a:off x="4434912" y="1649826"/>
+            <a:ext cx="2598660" cy="2743200"/>
+            <a:chOff x="4434912" y="1649826"/>
+            <a:chExt cx="2598660" cy="2743200"/>
+          </a:xfrm>
+        </p:grpSpPr>
+        <p:grpSp>
+          <p:nvGrpSpPr>
+            <p:cNvPr id="5" name="Group 4">
+              <a:extLst>
+                <a:ext uri="{FF2B5EF4-FFF2-40B4-BE49-F238E27FC236}">
+                  <a16:creationId xmlns:a16="http://schemas.microsoft.com/office/drawing/2014/main" id="{BCDAB326-948C-7924-33F2-EF9A2E71BF9E}"/>
+                </a:ext>
+              </a:extLst>
+            </p:cNvPr>
+            <p:cNvGrpSpPr/>
+            <p:nvPr/>
+          </p:nvGrpSpPr>
+          <p:grpSpPr>
+            <a:xfrm>
+              <a:off x="4434912" y="1649826"/>
+              <a:ext cx="2598660" cy="2743200"/>
+              <a:chOff x="4502645" y="1986643"/>
+              <a:chExt cx="1143000" cy="1143000"/>
+            </a:xfrm>
+            <a:solidFill>
+              <a:schemeClr val="accent1">
+                <a:lumMod val="40000"/>
+                <a:lumOff val="60000"/>
+              </a:schemeClr>
+            </a:solidFill>
+          </p:grpSpPr>
+          <p:sp>
+            <p:nvSpPr>
+              <p:cNvPr id="7" name="Hexagon 6">
+                <a:extLst>
+                  <a:ext uri="{FF2B5EF4-FFF2-40B4-BE49-F238E27FC236}">
+                    <a16:creationId xmlns:a16="http://schemas.microsoft.com/office/drawing/2014/main" id="{E934BCB0-6AD2-74E5-80DE-EDA410BE529F}"/>
+                  </a:ext>
+                </a:extLst>
+              </p:cNvPr>
+              <p:cNvSpPr/>
+              <p:nvPr/>
+            </p:nvSpPr>
+            <p:spPr>
+              <a:xfrm rot="16200000">
+                <a:off x="4502645" y="1986643"/>
+                <a:ext cx="1143000" cy="1143000"/>
+              </a:xfrm>
+              <a:prstGeom prst="hexagon">
+                <a:avLst/>
+              </a:prstGeom>
+              <a:solidFill>
+                <a:srgbClr val="FFFF00"/>
+              </a:solidFill>
+              <a:ln w="57150">
+                <a:solidFill>
+                  <a:schemeClr val="tx1"/>
+                </a:solidFill>
+              </a:ln>
+            </p:spPr>
+            <p:style>
+              <a:lnRef idx="2">
+                <a:schemeClr val="accent1">
+                  <a:shade val="15000"/>
+                </a:schemeClr>
+              </a:lnRef>
+              <a:fillRef idx="1">
+                <a:schemeClr val="accent1"/>
+              </a:fillRef>
+              <a:effectRef idx="0">
+                <a:schemeClr val="accent1"/>
+              </a:effectRef>
+              <a:fontRef idx="minor">
+                <a:schemeClr val="lt1"/>
+              </a:fontRef>
+            </p:style>
+            <p:txBody>
+              <a:bodyPr rtlCol="0" anchor="ctr"/>
+              <a:lstStyle/>
+              <a:p>
+                <a:pPr algn="ctr"/>
+                <a:endParaRPr lang="en-US" dirty="0"/>
+              </a:p>
+            </p:txBody>
+          </p:sp>
+          <p:sp>
+            <p:nvSpPr>
+              <p:cNvPr id="8" name="TextBox 7">
+                <a:extLst>
+                  <a:ext uri="{FF2B5EF4-FFF2-40B4-BE49-F238E27FC236}">
+                    <a16:creationId xmlns:a16="http://schemas.microsoft.com/office/drawing/2014/main" id="{7C8EDEDD-9C5D-65ED-DEDC-0C7603F32BA3}"/>
+                  </a:ext>
+                </a:extLst>
+              </p:cNvPr>
+              <p:cNvSpPr txBox="1"/>
+              <p:nvPr/>
+            </p:nvSpPr>
+            <p:spPr>
+              <a:xfrm>
+                <a:off x="4553391" y="2185973"/>
+                <a:ext cx="1041508" cy="397545"/>
+              </a:xfrm>
+              <a:prstGeom prst="rect">
+                <a:avLst/>
+              </a:prstGeom>
+              <a:noFill/>
+              <a:ln>
+                <a:noFill/>
+              </a:ln>
+            </p:spPr>
+            <p:txBody>
+              <a:bodyPr wrap="square" rtlCol="0">
+                <a:spAutoFit/>
+              </a:bodyPr>
+              <a:lstStyle/>
+              <a:p>
+                <a:pPr algn="ctr"/>
+                <a:r>
+                  <a:rPr lang="en-US" sz="2800" b="1" dirty="0">
+                    <a:latin typeface="Myanmar Text" panose="020B0502040204020203" pitchFamily="34" charset="0"/>
+                    <a:cs typeface="Myanmar Text" panose="020B0502040204020203" pitchFamily="34" charset="0"/>
+                  </a:rPr>
+                  <a:t>Gibbs Sampling</a:t>
+                </a:r>
+                <a:endParaRPr lang="en-US" sz="1400" b="1" dirty="0">
+                  <a:latin typeface="Myanmar Text" panose="020B0502040204020203" pitchFamily="34" charset="0"/>
+                  <a:cs typeface="Myanmar Text" panose="020B0502040204020203" pitchFamily="34" charset="0"/>
+                </a:endParaRPr>
+              </a:p>
+            </p:txBody>
+          </p:sp>
+        </p:grpSp>
+        <p:pic>
+          <p:nvPicPr>
+            <p:cNvPr id="10" name="Picture 9">
+              <a:extLst>
+                <a:ext uri="{FF2B5EF4-FFF2-40B4-BE49-F238E27FC236}">
+                  <a16:creationId xmlns:a16="http://schemas.microsoft.com/office/drawing/2014/main" id="{8745960E-22D2-8871-605B-110BBAB51CC4}"/>
+                </a:ext>
+              </a:extLst>
+            </p:cNvPr>
+            <p:cNvPicPr>
+              <a:picLocks noChangeAspect="1"/>
+            </p:cNvPicPr>
+            <p:nvPr/>
+          </p:nvPicPr>
+          <p:blipFill>
+            <a:blip r:embed="rId2"/>
+            <a:stretch>
+              <a:fillRect/>
+            </a:stretch>
+          </p:blipFill>
+          <p:spPr>
+            <a:xfrm>
+              <a:off x="5181604" y="3021425"/>
+              <a:ext cx="1105276" cy="1018399"/>
+            </a:xfrm>
+            <a:prstGeom prst="rect">
+              <a:avLst/>
+            </a:prstGeom>
+          </p:spPr>
+        </p:pic>
+        <p:pic>
+          <p:nvPicPr>
+            <p:cNvPr id="11" name="Picture 10">
+              <a:extLst>
+                <a:ext uri="{FF2B5EF4-FFF2-40B4-BE49-F238E27FC236}">
+                  <a16:creationId xmlns:a16="http://schemas.microsoft.com/office/drawing/2014/main" id="{7FAA0D33-C59C-5C8C-AD22-94B621D79B91}"/>
+                </a:ext>
+              </a:extLst>
+            </p:cNvPr>
+            <p:cNvPicPr>
+              <a:picLocks noChangeAspect="1"/>
+            </p:cNvPicPr>
+            <p:nvPr/>
+          </p:nvPicPr>
+          <p:blipFill>
+            <a:blip r:embed="rId3"/>
+            <a:stretch>
+              <a:fillRect/>
+            </a:stretch>
+          </p:blipFill>
+          <p:spPr>
+            <a:xfrm>
+              <a:off x="5580760" y="2963422"/>
+              <a:ext cx="1263505" cy="812253"/>
+            </a:xfrm>
+            <a:prstGeom prst="rect">
+              <a:avLst/>
+            </a:prstGeom>
+          </p:spPr>
+        </p:pic>
+      </p:grpSp>
+      <p:grpSp>
+        <p:nvGrpSpPr>
+          <p:cNvPr id="16" name="Group 15">
+            <a:extLst>
+              <a:ext uri="{FF2B5EF4-FFF2-40B4-BE49-F238E27FC236}">
+                <a16:creationId xmlns:a16="http://schemas.microsoft.com/office/drawing/2014/main" id="{DE9B9239-2632-8333-2F1C-EAF86E0A6F9B}"/>
+              </a:ext>
+            </a:extLst>
+          </p:cNvPr>
+          <p:cNvGrpSpPr/>
+          <p:nvPr/>
+        </p:nvGrpSpPr>
+        <p:grpSpPr>
+          <a:xfrm>
+            <a:off x="1321015" y="1649826"/>
+            <a:ext cx="2598660" cy="2743200"/>
+            <a:chOff x="1167533" y="2270313"/>
+            <a:chExt cx="2598660" cy="2743200"/>
+          </a:xfrm>
+        </p:grpSpPr>
+        <p:grpSp>
+          <p:nvGrpSpPr>
+            <p:cNvPr id="6" name="Group 5">
+              <a:extLst>
+                <a:ext uri="{FF2B5EF4-FFF2-40B4-BE49-F238E27FC236}">
+                  <a16:creationId xmlns:a16="http://schemas.microsoft.com/office/drawing/2014/main" id="{118DD223-AB69-D059-33B7-4CBAD0CCAB31}"/>
+                </a:ext>
+              </a:extLst>
+            </p:cNvPr>
+            <p:cNvGrpSpPr/>
+            <p:nvPr/>
+          </p:nvGrpSpPr>
+          <p:grpSpPr>
+            <a:xfrm>
+              <a:off x="1167533" y="2270313"/>
+              <a:ext cx="2598660" cy="2743200"/>
+              <a:chOff x="4514577" y="1660072"/>
+              <a:chExt cx="1143000" cy="1143000"/>
+            </a:xfrm>
+            <a:solidFill>
+              <a:schemeClr val="accent1">
+                <a:lumMod val="40000"/>
+                <a:lumOff val="60000"/>
+              </a:schemeClr>
+            </a:solidFill>
+          </p:grpSpPr>
+          <p:sp>
+            <p:nvSpPr>
+              <p:cNvPr id="14" name="Hexagon 13">
+                <a:extLst>
+                  <a:ext uri="{FF2B5EF4-FFF2-40B4-BE49-F238E27FC236}">
+                    <a16:creationId xmlns:a16="http://schemas.microsoft.com/office/drawing/2014/main" id="{5B4D26AB-B8BE-8AF7-1D71-B73A1BBE8530}"/>
+                  </a:ext>
+                </a:extLst>
+              </p:cNvPr>
+              <p:cNvSpPr/>
+              <p:nvPr/>
+            </p:nvSpPr>
+            <p:spPr>
+              <a:xfrm rot="16200000">
+                <a:off x="4514577" y="1660072"/>
+                <a:ext cx="1143000" cy="1143000"/>
+              </a:xfrm>
+              <a:prstGeom prst="hexagon">
+                <a:avLst/>
+              </a:prstGeom>
+              <a:solidFill>
+                <a:schemeClr val="accent6">
+                  <a:lumMod val="20000"/>
+                  <a:lumOff val="80000"/>
+                </a:schemeClr>
+              </a:solidFill>
+              <a:ln w="57150">
+                <a:solidFill>
+                  <a:srgbClr val="00B0F0"/>
+                </a:solidFill>
+              </a:ln>
+            </p:spPr>
+            <p:style>
+              <a:lnRef idx="2">
+                <a:schemeClr val="accent1">
+                  <a:shade val="15000"/>
+                </a:schemeClr>
+              </a:lnRef>
+              <a:fillRef idx="1">
+                <a:schemeClr val="accent1"/>
+              </a:fillRef>
+              <a:effectRef idx="0">
+                <a:schemeClr val="accent1"/>
+              </a:effectRef>
+              <a:fontRef idx="minor">
+                <a:schemeClr val="lt1"/>
+              </a:fontRef>
+            </p:style>
+            <p:txBody>
+              <a:bodyPr rtlCol="0" anchor="ctr"/>
+              <a:lstStyle/>
+              <a:p>
+                <a:pPr algn="ctr"/>
+                <a:endParaRPr lang="en-US" dirty="0"/>
+              </a:p>
+            </p:txBody>
+          </p:sp>
+          <p:sp>
+            <p:nvSpPr>
+              <p:cNvPr id="15" name="TextBox 14">
+                <a:extLst>
+                  <a:ext uri="{FF2B5EF4-FFF2-40B4-BE49-F238E27FC236}">
+                    <a16:creationId xmlns:a16="http://schemas.microsoft.com/office/drawing/2014/main" id="{8804622B-347B-E8A0-E1B9-6A75D59C20EA}"/>
+                  </a:ext>
+                </a:extLst>
+              </p:cNvPr>
+              <p:cNvSpPr txBox="1"/>
+              <p:nvPr/>
+            </p:nvSpPr>
+            <p:spPr>
+              <a:xfrm>
+                <a:off x="4553659" y="1825286"/>
+                <a:ext cx="1041508" cy="346249"/>
+              </a:xfrm>
+              <a:prstGeom prst="rect">
+                <a:avLst/>
+              </a:prstGeom>
+              <a:noFill/>
+              <a:ln>
+                <a:noFill/>
+              </a:ln>
+            </p:spPr>
+            <p:txBody>
+              <a:bodyPr wrap="square" rtlCol="0">
+                <a:spAutoFit/>
+              </a:bodyPr>
+              <a:lstStyle/>
+              <a:p>
+                <a:pPr algn="ctr"/>
+                <a:r>
+                  <a:rPr lang="en-US" sz="2400" b="1" dirty="0">
+                    <a:solidFill>
+                      <a:srgbClr val="00B050"/>
+                    </a:solidFill>
+                    <a:latin typeface="Myanmar Text" panose="020B0502040204020203" pitchFamily="34" charset="0"/>
+                    <a:cs typeface="Myanmar Text" panose="020B0502040204020203" pitchFamily="34" charset="0"/>
+                  </a:rPr>
+                  <a:t>Climate</a:t>
+                </a:r>
+              </a:p>
+              <a:p>
+                <a:pPr algn="ctr"/>
+                <a:r>
+                  <a:rPr lang="en-US" sz="2400" b="1" dirty="0">
+                    <a:solidFill>
+                      <a:srgbClr val="00B050"/>
+                    </a:solidFill>
+                    <a:latin typeface="Myanmar Text" panose="020B0502040204020203" pitchFamily="34" charset="0"/>
+                    <a:cs typeface="Myanmar Text" panose="020B0502040204020203" pitchFamily="34" charset="0"/>
+                  </a:rPr>
+                  <a:t>Data Viz</a:t>
+                </a:r>
+                <a:endParaRPr lang="en-US" sz="1200" b="1" dirty="0">
+                  <a:solidFill>
+                    <a:srgbClr val="00B050"/>
+                  </a:solidFill>
+                  <a:latin typeface="Myanmar Text" panose="020B0502040204020203" pitchFamily="34" charset="0"/>
+                  <a:cs typeface="Myanmar Text" panose="020B0502040204020203" pitchFamily="34" charset="0"/>
+                </a:endParaRPr>
+              </a:p>
+            </p:txBody>
+          </p:sp>
+        </p:grpSp>
+        <p:pic>
+          <p:nvPicPr>
+            <p:cNvPr id="3" name="Picture 2">
+              <a:extLst>
+                <a:ext uri="{FF2B5EF4-FFF2-40B4-BE49-F238E27FC236}">
+                  <a16:creationId xmlns:a16="http://schemas.microsoft.com/office/drawing/2014/main" id="{C4D7433D-CBBE-76FD-11F7-9B448A02CF40}"/>
+                </a:ext>
+              </a:extLst>
+            </p:cNvPr>
+            <p:cNvPicPr>
+              <a:picLocks noChangeAspect="1"/>
+            </p:cNvPicPr>
+            <p:nvPr/>
+          </p:nvPicPr>
+          <p:blipFill>
+            <a:blip r:embed="rId4"/>
+            <a:stretch>
+              <a:fillRect/>
+            </a:stretch>
+          </p:blipFill>
+          <p:spPr>
+            <a:xfrm>
+              <a:off x="1616441" y="3253271"/>
+              <a:ext cx="1711098" cy="1573106"/>
+            </a:xfrm>
+            <a:prstGeom prst="rect">
+              <a:avLst/>
+            </a:prstGeom>
+          </p:spPr>
+        </p:pic>
+      </p:grpSp>
+      <p:grpSp>
+        <p:nvGrpSpPr>
+          <p:cNvPr id="2" name="Group 1">
+            <a:extLst>
+              <a:ext uri="{FF2B5EF4-FFF2-40B4-BE49-F238E27FC236}">
+                <a16:creationId xmlns:a16="http://schemas.microsoft.com/office/drawing/2014/main" id="{53AE32B3-BE0F-921F-BCC2-400D7592DDA3}"/>
+              </a:ext>
+            </a:extLst>
+          </p:cNvPr>
+          <p:cNvGrpSpPr/>
+          <p:nvPr/>
+        </p:nvGrpSpPr>
+        <p:grpSpPr>
+          <a:xfrm>
+            <a:off x="7432728" y="1649825"/>
+            <a:ext cx="2598660" cy="2743200"/>
+            <a:chOff x="7432728" y="1649825"/>
+            <a:chExt cx="2598660" cy="2743200"/>
+          </a:xfrm>
+        </p:grpSpPr>
+        <p:grpSp>
+          <p:nvGrpSpPr>
+            <p:cNvPr id="4" name="Group 3">
+              <a:extLst>
+                <a:ext uri="{FF2B5EF4-FFF2-40B4-BE49-F238E27FC236}">
+                  <a16:creationId xmlns:a16="http://schemas.microsoft.com/office/drawing/2014/main" id="{96227849-CFFA-94BB-4B2F-914B3D080FBE}"/>
+                </a:ext>
+              </a:extLst>
+            </p:cNvPr>
+            <p:cNvGrpSpPr/>
+            <p:nvPr/>
+          </p:nvGrpSpPr>
+          <p:grpSpPr>
+            <a:xfrm>
+              <a:off x="7432728" y="1649825"/>
+              <a:ext cx="2598660" cy="2743200"/>
+              <a:chOff x="4502645" y="1986643"/>
+              <a:chExt cx="1143000" cy="1143000"/>
+            </a:xfrm>
+            <a:solidFill>
+              <a:schemeClr val="accent1">
+                <a:lumMod val="40000"/>
+                <a:lumOff val="60000"/>
+              </a:schemeClr>
+            </a:solidFill>
+          </p:grpSpPr>
+          <p:sp>
+            <p:nvSpPr>
+              <p:cNvPr id="17" name="Hexagon 16">
+                <a:extLst>
+                  <a:ext uri="{FF2B5EF4-FFF2-40B4-BE49-F238E27FC236}">
+                    <a16:creationId xmlns:a16="http://schemas.microsoft.com/office/drawing/2014/main" id="{918FA055-8737-5A0F-0F89-AA2C93028198}"/>
+                  </a:ext>
+                </a:extLst>
+              </p:cNvPr>
+              <p:cNvSpPr/>
+              <p:nvPr/>
+            </p:nvSpPr>
+            <p:spPr>
+              <a:xfrm rot="16200000">
+                <a:off x="4502645" y="1986643"/>
+                <a:ext cx="1143000" cy="1143000"/>
+              </a:xfrm>
+              <a:prstGeom prst="hexagon">
+                <a:avLst/>
+              </a:prstGeom>
+              <a:solidFill>
+                <a:schemeClr val="accent1">
+                  <a:lumMod val="75000"/>
+                </a:schemeClr>
+              </a:solidFill>
+              <a:ln w="57150">
+                <a:solidFill>
+                  <a:schemeClr val="bg1">
+                    <a:lumMod val="85000"/>
+                  </a:schemeClr>
+                </a:solidFill>
+              </a:ln>
+            </p:spPr>
+            <p:style>
+              <a:lnRef idx="2">
+                <a:schemeClr val="accent1">
+                  <a:shade val="15000"/>
+                </a:schemeClr>
+              </a:lnRef>
+              <a:fillRef idx="1">
+                <a:schemeClr val="accent1"/>
+              </a:fillRef>
+              <a:effectRef idx="0">
+                <a:schemeClr val="accent1"/>
+              </a:effectRef>
+              <a:fontRef idx="minor">
+                <a:schemeClr val="lt1"/>
+              </a:fontRef>
+            </p:style>
+            <p:txBody>
+              <a:bodyPr rtlCol="0" anchor="ctr"/>
+              <a:lstStyle/>
+              <a:p>
+                <a:pPr algn="ctr"/>
+                <a:endParaRPr lang="en-US" dirty="0"/>
+              </a:p>
+            </p:txBody>
+          </p:sp>
+          <p:sp>
+            <p:nvSpPr>
+              <p:cNvPr id="18" name="TextBox 17">
+                <a:extLst>
+                  <a:ext uri="{FF2B5EF4-FFF2-40B4-BE49-F238E27FC236}">
+                    <a16:creationId xmlns:a16="http://schemas.microsoft.com/office/drawing/2014/main" id="{A9B0B404-D23F-79A6-F211-71CFAB622251}"/>
+                  </a:ext>
+                </a:extLst>
+              </p:cNvPr>
+              <p:cNvSpPr txBox="1"/>
+              <p:nvPr/>
+            </p:nvSpPr>
+            <p:spPr>
+              <a:xfrm>
+                <a:off x="4553391" y="2227295"/>
+                <a:ext cx="1041508" cy="294953"/>
+              </a:xfrm>
+              <a:prstGeom prst="rect">
+                <a:avLst/>
+              </a:prstGeom>
+              <a:noFill/>
+              <a:ln>
+                <a:noFill/>
+              </a:ln>
+            </p:spPr>
+            <p:txBody>
+              <a:bodyPr wrap="square" rtlCol="0">
+                <a:spAutoFit/>
+              </a:bodyPr>
+              <a:lstStyle/>
+              <a:p>
+                <a:pPr algn="ctr"/>
+                <a:r>
+                  <a:rPr lang="en-US" sz="2000" b="1" dirty="0">
+                    <a:solidFill>
+                      <a:schemeClr val="bg1">
+                        <a:lumMod val="95000"/>
+                      </a:schemeClr>
+                    </a:solidFill>
+                    <a:latin typeface="Myanmar Text" panose="020B0502040204020203" pitchFamily="34" charset="0"/>
+                    <a:cs typeface="Myanmar Text" panose="020B0502040204020203" pitchFamily="34" charset="0"/>
+                  </a:rPr>
+                  <a:t>Computational Methods</a:t>
+                </a:r>
+                <a:endParaRPr lang="en-US" sz="1100" b="1" dirty="0">
+                  <a:solidFill>
+                    <a:schemeClr val="bg1">
+                      <a:lumMod val="95000"/>
+                    </a:schemeClr>
+                  </a:solidFill>
+                  <a:latin typeface="Myanmar Text" panose="020B0502040204020203" pitchFamily="34" charset="0"/>
+                  <a:cs typeface="Myanmar Text" panose="020B0502040204020203" pitchFamily="34" charset="0"/>
+                </a:endParaRPr>
+              </a:p>
+            </p:txBody>
+          </p:sp>
+        </p:grpSp>
+        <p:grpSp>
+          <p:nvGrpSpPr>
+            <p:cNvPr id="23" name="Group 22">
+              <a:extLst>
+                <a:ext uri="{FF2B5EF4-FFF2-40B4-BE49-F238E27FC236}">
+                  <a16:creationId xmlns:a16="http://schemas.microsoft.com/office/drawing/2014/main" id="{F52FAE41-6D99-DBBF-28BB-26648955F751}"/>
+                </a:ext>
+              </a:extLst>
+            </p:cNvPr>
+            <p:cNvGrpSpPr/>
+            <p:nvPr/>
+          </p:nvGrpSpPr>
+          <p:grpSpPr>
+            <a:xfrm>
+              <a:off x="8132802" y="2725788"/>
+              <a:ext cx="1304182" cy="1314036"/>
+              <a:chOff x="8991747" y="4241113"/>
+              <a:chExt cx="1661433" cy="1832250"/>
+            </a:xfrm>
+          </p:grpSpPr>
+          <p:sp>
+            <p:nvSpPr>
+              <p:cNvPr id="22" name="7-Point Star 21">
+                <a:extLst>
+                  <a:ext uri="{FF2B5EF4-FFF2-40B4-BE49-F238E27FC236}">
+                    <a16:creationId xmlns:a16="http://schemas.microsoft.com/office/drawing/2014/main" id="{653EBD95-8758-F5A4-784C-68ED769B19BC}"/>
+                  </a:ext>
+                </a:extLst>
+              </p:cNvPr>
+              <p:cNvSpPr/>
+              <p:nvPr/>
+            </p:nvSpPr>
+            <p:spPr>
+              <a:xfrm>
+                <a:off x="8992615" y="4499025"/>
+                <a:ext cx="1468556" cy="1488117"/>
+              </a:xfrm>
+              <a:prstGeom prst="star7">
+                <a:avLst/>
+              </a:prstGeom>
+              <a:solidFill>
+                <a:srgbClr val="00B0F0"/>
+              </a:solidFill>
+              <a:ln>
+                <a:solidFill>
+                  <a:schemeClr val="bg1">
+                    <a:lumMod val="85000"/>
+                  </a:schemeClr>
+                </a:solidFill>
+              </a:ln>
+            </p:spPr>
+            <p:style>
+              <a:lnRef idx="2">
+                <a:schemeClr val="accent1">
+                  <a:shade val="15000"/>
+                </a:schemeClr>
+              </a:lnRef>
+              <a:fillRef idx="1">
+                <a:schemeClr val="accent1"/>
+              </a:fillRef>
+              <a:effectRef idx="0">
+                <a:schemeClr val="accent1"/>
+              </a:effectRef>
+              <a:fontRef idx="minor">
+                <a:schemeClr val="lt1"/>
+              </a:fontRef>
+            </p:style>
+            <p:txBody>
+              <a:bodyPr rtlCol="0" anchor="ctr"/>
+              <a:lstStyle/>
+              <a:p>
+                <a:pPr algn="ctr"/>
+                <a:endParaRPr lang="en-US"/>
+              </a:p>
+            </p:txBody>
+          </p:sp>
+          <p:grpSp>
+            <p:nvGrpSpPr>
+              <p:cNvPr id="21" name="Group 20">
+                <a:extLst>
+                  <a:ext uri="{FF2B5EF4-FFF2-40B4-BE49-F238E27FC236}">
+                    <a16:creationId xmlns:a16="http://schemas.microsoft.com/office/drawing/2014/main" id="{2D882A8B-CA2C-2D56-27FC-57896EAEFBDD}"/>
+                  </a:ext>
+                </a:extLst>
+              </p:cNvPr>
+              <p:cNvGrpSpPr/>
+              <p:nvPr/>
+            </p:nvGrpSpPr>
+            <p:grpSpPr>
+              <a:xfrm>
+                <a:off x="8991747" y="4241113"/>
+                <a:ext cx="1661433" cy="1832250"/>
+                <a:chOff x="5255107" y="2544521"/>
+                <a:chExt cx="3174999" cy="3174998"/>
+              </a:xfrm>
+            </p:grpSpPr>
+            <p:pic>
+              <p:nvPicPr>
+                <p:cNvPr id="19" name="Picture 18">
+                  <a:extLst>
+                    <a:ext uri="{FF2B5EF4-FFF2-40B4-BE49-F238E27FC236}">
+                      <a16:creationId xmlns:a16="http://schemas.microsoft.com/office/drawing/2014/main" id="{EC101D8D-E40B-249A-D906-C63DF0D14D12}"/>
+                    </a:ext>
+                  </a:extLst>
+                </p:cNvPr>
+                <p:cNvPicPr>
+                  <a:picLocks noChangeAspect="1"/>
+                </p:cNvPicPr>
+                <p:nvPr/>
+              </p:nvPicPr>
+              <p:blipFill>
+                <a:blip r:embed="rId5"/>
+                <a:stretch>
+                  <a:fillRect/>
+                </a:stretch>
+              </p:blipFill>
+              <p:spPr>
+                <a:xfrm>
+                  <a:off x="5255107" y="2544521"/>
+                  <a:ext cx="3174999" cy="3174998"/>
+                </a:xfrm>
+                <a:prstGeom prst="rect">
+                  <a:avLst/>
+                </a:prstGeom>
+              </p:spPr>
+            </p:pic>
+            <p:pic>
+              <p:nvPicPr>
+                <p:cNvPr id="20" name="Picture 19">
+                  <a:extLst>
+                    <a:ext uri="{FF2B5EF4-FFF2-40B4-BE49-F238E27FC236}">
+                      <a16:creationId xmlns:a16="http://schemas.microsoft.com/office/drawing/2014/main" id="{1C360D92-6CAE-C9F1-C55C-55B9CF4C49E1}"/>
+                    </a:ext>
+                  </a:extLst>
+                </p:cNvPr>
+                <p:cNvPicPr>
+                  <a:picLocks noChangeAspect="1"/>
+                </p:cNvPicPr>
+                <p:nvPr/>
+              </p:nvPicPr>
+              <p:blipFill>
+                <a:blip r:embed="rId6"/>
+                <a:stretch>
+                  <a:fillRect/>
+                </a:stretch>
+              </p:blipFill>
+              <p:spPr>
+                <a:xfrm>
+                  <a:off x="6096000" y="3703091"/>
+                  <a:ext cx="631590" cy="490990"/>
+                </a:xfrm>
+                <a:prstGeom prst="rect">
+                  <a:avLst/>
+                </a:prstGeom>
+              </p:spPr>
+            </p:pic>
+          </p:grpSp>
+        </p:grpSp>
+      </p:grpSp>
+    </p:spTree>
+    <p:extLst>
+      <p:ext uri="{BB962C8B-B14F-4D97-AF65-F5344CB8AC3E}">
+        <p14:creationId xmlns:p14="http://schemas.microsoft.com/office/powerpoint/2010/main" val="558246848"/>
+      </p:ext>
+    </p:extLst>
+  </p:cSld>
+  <p:clrMapOvr>
+    <a:masterClrMapping/>
+  </p:clrMapOvr>
+</p:sld>
+</file>
+
 <file path=ppt/theme/theme1.xml><?xml version="1.0" encoding="utf-8"?>
 <a:theme xmlns:a="http://schemas.openxmlformats.org/drawingml/2006/main" name="Office Theme">
   <a:themeElements>

</xml_diff>